<commit_message>
updated ppt and final document
</commit_message>
<xml_diff>
--- a/Electricity_Demand/final/final.pptx
+++ b/Electricity_Demand/final/final.pptx
@@ -232,7 +232,7 @@
           <a:p>
             <a:fld id="{FCA63A55-8B5F-0F46-90BC-A5EF6CD4CCC4}" type="datetimeFigureOut">
               <a:rPr lang="en-US" smtClean="0"/>
-              <a:t>12/9/18</a:t>
+              <a:t>12/17/18</a:t>
             </a:fld>
             <a:endParaRPr lang="en-US"/>
           </a:p>
@@ -864,7 +864,7 @@
           <a:p>
             <a:fld id="{ECD19FB2-3AAB-4D03-B13A-2960828C78E3}" type="datetimeFigureOut">
               <a:rPr lang="en-US" dirty="0"/>
-              <a:t>12/9/18</a:t>
+              <a:t>12/17/18</a:t>
             </a:fld>
             <a:endParaRPr lang="en-US" dirty="0"/>
           </a:p>
@@ -1141,7 +1141,7 @@
           <a:p>
             <a:fld id="{1B80C674-7DFC-42FE-B9CD-82963CDB1557}" type="datetimeFigureOut">
               <a:rPr lang="en-US" dirty="0"/>
-              <a:t>12/9/18</a:t>
+              <a:t>12/17/18</a:t>
             </a:fld>
             <a:endParaRPr lang="en-US" dirty="0"/>
           </a:p>
@@ -1328,7 +1328,7 @@
           <a:p>
             <a:fld id="{2076456F-F47D-4F25-8053-2A695DA0CA7D}" type="datetimeFigureOut">
               <a:rPr lang="en-US" dirty="0"/>
-              <a:t>12/9/18</a:t>
+              <a:t>12/17/18</a:t>
             </a:fld>
             <a:endParaRPr lang="en-US" dirty="0"/>
           </a:p>
@@ -1584,7 +1584,7 @@
           <a:p>
             <a:fld id="{5D6C7379-69CC-4837-9905-BEBA22830C8A}" type="datetimeFigureOut">
               <a:rPr lang="en-US" dirty="0"/>
-              <a:t>12/9/18</a:t>
+              <a:t>12/17/18</a:t>
             </a:fld>
             <a:endParaRPr lang="en-US" dirty="0"/>
           </a:p>
@@ -2005,7 +2005,7 @@
           <a:p>
             <a:fld id="{49EB8B7E-8AEE-4F10-BFEE-C999AD004D36}" type="datetimeFigureOut">
               <a:rPr lang="en-US" dirty="0"/>
-              <a:t>12/9/18</a:t>
+              <a:t>12/17/18</a:t>
             </a:fld>
             <a:endParaRPr lang="en-US" dirty="0"/>
           </a:p>
@@ -2546,7 +2546,7 @@
           <a:p>
             <a:fld id="{8668F3F9-58BC-440B-B37B-805B9055EF92}" type="datetimeFigureOut">
               <a:rPr lang="en-US" dirty="0"/>
-              <a:t>12/9/18</a:t>
+              <a:t>12/17/18</a:t>
             </a:fld>
             <a:endParaRPr lang="en-US" dirty="0"/>
           </a:p>
@@ -3372,7 +3372,7 @@
           <a:p>
             <a:fld id="{0D5A53AF-48EA-489D-8260-9DCAB666386A}" type="datetimeFigureOut">
               <a:rPr lang="en-US" dirty="0"/>
-              <a:t>12/9/18</a:t>
+              <a:t>12/17/18</a:t>
             </a:fld>
             <a:endParaRPr lang="en-US" dirty="0"/>
           </a:p>
@@ -3537,7 +3537,7 @@
           <a:p>
             <a:fld id="{0DED02AE-B9A4-47BD-AF8E-97E16144138B}" type="datetimeFigureOut">
               <a:rPr lang="en-US" dirty="0"/>
-              <a:t>12/9/18</a:t>
+              <a:t>12/17/18</a:t>
             </a:fld>
             <a:endParaRPr lang="en-US" dirty="0"/>
           </a:p>
@@ -3712,7 +3712,7 @@
           <a:p>
             <a:fld id="{CF0FD78B-DB02-4362-BCDC-98A55456977C}" type="datetimeFigureOut">
               <a:rPr lang="en-US" dirty="0"/>
-              <a:t>12/9/18</a:t>
+              <a:t>12/17/18</a:t>
             </a:fld>
             <a:endParaRPr lang="en-US" dirty="0"/>
           </a:p>
@@ -3877,7 +3877,7 @@
           <a:p>
             <a:fld id="{99916976-5D93-46E4-A98A-FAD63E4D0EA8}" type="datetimeFigureOut">
               <a:rPr lang="en-US" dirty="0"/>
-              <a:t>12/9/18</a:t>
+              <a:t>12/17/18</a:t>
             </a:fld>
             <a:endParaRPr lang="en-US" dirty="0"/>
           </a:p>
@@ -4129,7 +4129,7 @@
           <a:p>
             <a:fld id="{0F39F4F5-F4D2-4D2A-AB60-88D37ADCB869}" type="datetimeFigureOut">
               <a:rPr lang="en-US" dirty="0"/>
-              <a:t>12/9/18</a:t>
+              <a:t>12/17/18</a:t>
             </a:fld>
             <a:endParaRPr lang="en-US" dirty="0"/>
           </a:p>
@@ -4356,7 +4356,7 @@
           <a:p>
             <a:fld id="{D23BC6CE-6D1E-47E5-8859-F31AC5380EB2}" type="datetimeFigureOut">
               <a:rPr lang="en-US" dirty="0"/>
-              <a:t>12/9/18</a:t>
+              <a:t>12/17/18</a:t>
             </a:fld>
             <a:endParaRPr lang="en-US" dirty="0"/>
           </a:p>
@@ -4744,7 +4744,7 @@
           <a:p>
             <a:fld id="{B1B4E7C4-4DA4-404D-9965-B13F2DD7D8BF}" type="datetimeFigureOut">
               <a:rPr lang="en-US" dirty="0"/>
-              <a:t>12/9/18</a:t>
+              <a:t>12/17/18</a:t>
             </a:fld>
             <a:endParaRPr lang="en-US" dirty="0"/>
           </a:p>
@@ -4857,7 +4857,7 @@
           <a:p>
             <a:fld id="{476FB7AA-4A53-424F-AD41-70827B6504BA}" type="datetimeFigureOut">
               <a:rPr lang="en-US" dirty="0"/>
-              <a:t>12/9/18</a:t>
+              <a:t>12/17/18</a:t>
             </a:fld>
             <a:endParaRPr lang="en-US" dirty="0"/>
           </a:p>
@@ -4947,7 +4947,7 @@
           <a:p>
             <a:fld id="{E7884882-FB12-4BC8-9960-9AD8104D7FAE}" type="datetimeFigureOut">
               <a:rPr lang="en-US" dirty="0"/>
-              <a:t>12/9/18</a:t>
+              <a:t>12/17/18</a:t>
             </a:fld>
             <a:endParaRPr lang="en-US" dirty="0"/>
           </a:p>
@@ -5215,7 +5215,7 @@
           <a:p>
             <a:fld id="{F7D1BD23-6E54-4D9D-AD88-A2813C73CC25}" type="datetimeFigureOut">
               <a:rPr lang="en-US" dirty="0"/>
-              <a:t>12/9/18</a:t>
+              <a:t>12/17/18</a:t>
             </a:fld>
             <a:endParaRPr lang="en-US" dirty="0"/>
           </a:p>
@@ -5491,7 +5491,7 @@
           <a:p>
             <a:fld id="{1471A834-4F3C-4AF9-9C74-05EC35A0F292}" type="datetimeFigureOut">
               <a:rPr lang="en-US" dirty="0"/>
-              <a:t>12/9/18</a:t>
+              <a:t>12/17/18</a:t>
             </a:fld>
             <a:endParaRPr lang="en-US" dirty="0"/>
           </a:p>
@@ -5726,7 +5726,7 @@
           <a:p>
             <a:fld id="{51CF1133-3259-4C45-BABA-5B62D9C6F78D}" type="datetimeFigureOut">
               <a:rPr lang="en-US" dirty="0"/>
-              <a:t>12/9/18</a:t>
+              <a:t>12/17/18</a:t>
             </a:fld>
             <a:endParaRPr lang="en-US" dirty="0"/>
           </a:p>
@@ -6341,11 +6341,7 @@
             <a:pPr algn="ctr"/>
             <a:r>
               <a:rPr lang="en-US" sz="4400" dirty="0" smtClean="0"/>
-              <a:t>Robert V </a:t>
-            </a:r>
-            <a:r>
-              <a:rPr lang="en-US" sz="4400" dirty="0" smtClean="0"/>
-              <a:t>Gramillano</a:t>
+              <a:t>Robert V Gramillano</a:t>
             </a:r>
             <a:endParaRPr lang="en-US" sz="4400" dirty="0"/>
           </a:p>
@@ -6488,11 +6484,7 @@
             </a:r>
             <a:r>
               <a:rPr lang="en-US" sz="3600" dirty="0" smtClean="0"/>
-              <a:t>eature </a:t>
-            </a:r>
-            <a:r>
-              <a:rPr lang="en-US" sz="3600" dirty="0" smtClean="0"/>
-              <a:t>statistics</a:t>
+              <a:t>eature statistics</a:t>
             </a:r>
             <a:endParaRPr lang="en-US" sz="3600" dirty="0"/>
           </a:p>
@@ -6603,31 +6595,7 @@
             </a:pPr>
             <a:r>
               <a:rPr lang="en-US" sz="3600" b="1" dirty="0" smtClean="0"/>
-              <a:t>All together, our combined data set contains electricity and weather </a:t>
-            </a:r>
-            <a:r>
-              <a:rPr lang="en-US" sz="3600" b="1" dirty="0" smtClean="0"/>
-              <a:t>data, </a:t>
-            </a:r>
-            <a:r>
-              <a:rPr lang="en-US" sz="3600" b="1" dirty="0" smtClean="0"/>
-              <a:t>from July 2015 to September 2018 with a total of </a:t>
-            </a:r>
-            <a:r>
-              <a:rPr lang="en-US" sz="3600" b="1" dirty="0" smtClean="0"/>
-              <a:t>~</a:t>
-            </a:r>
-            <a:r>
-              <a:rPr lang="en-US" sz="3600" b="1" dirty="0" smtClean="0"/>
-              <a:t>27</a:t>
-            </a:r>
-            <a:r>
-              <a:rPr lang="en-US" sz="3600" b="1" dirty="0" smtClean="0"/>
-              <a:t>K </a:t>
-            </a:r>
-            <a:r>
-              <a:rPr lang="en-US" sz="3600" b="1" dirty="0" smtClean="0"/>
-              <a:t>data points to be used for training</a:t>
+              <a:t>All together, our combined data set contains electricity and weather data, from July 2015 to September 2018 with a total of ~27K data points to be used for training</a:t>
             </a:r>
             <a:endParaRPr lang="en-US" sz="3600" b="1" dirty="0"/>
           </a:p>
@@ -7851,11 +7819,7 @@
             <a:pPr algn="ctr"/>
             <a:r>
               <a:rPr lang="en-US" dirty="0" smtClean="0"/>
-              <a:t>Multivariate OLS </a:t>
-            </a:r>
-            <a:r>
-              <a:rPr lang="en-US" dirty="0" smtClean="0"/>
-              <a:t>regression</a:t>
+              <a:t>Multivariate OLS regression</a:t>
             </a:r>
             <a:endParaRPr lang="en-US" dirty="0"/>
           </a:p>
@@ -8734,7 +8698,7 @@
       </p:sp>
       <p:pic>
         <p:nvPicPr>
-          <p:cNvPr id="4" name="Picture 3"/>
+          <p:cNvPr id="5" name="Picture 4"/>
           <p:cNvPicPr>
             <a:picLocks noChangeAspect="1"/>
           </p:cNvPicPr>
@@ -8754,8 +8718,8 @@
         </p:blipFill>
         <p:spPr>
           <a:xfrm>
-            <a:off x="2370455" y="2914650"/>
-            <a:ext cx="7732890" cy="3262313"/>
+            <a:off x="2239433" y="2843214"/>
+            <a:ext cx="7713133" cy="3333750"/>
           </a:xfrm>
           <a:prstGeom prst="rect">
             <a:avLst/>
@@ -9100,8 +9064,13 @@
             </a:r>
             <a:r>
               <a:rPr lang="en-US" b="1" dirty="0" smtClean="0"/>
-              <a:t>: 0.961</a:t>
-            </a:r>
+              <a:t>: </a:t>
+            </a:r>
+            <a:r>
+              <a:rPr lang="en-US" b="1" dirty="0" smtClean="0"/>
+              <a:t>0.958</a:t>
+            </a:r>
+            <a:endParaRPr lang="en-US" b="1" dirty="0" smtClean="0"/>
           </a:p>
           <a:p>
             <a:pPr marL="0" indent="0" algn="ctr">
@@ -9109,7 +9078,15 @@
             </a:pPr>
             <a:r>
               <a:rPr lang="en-US" b="1" dirty="0" smtClean="0"/>
-              <a:t> RMSE: 156.8 MWh</a:t>
+              <a:t> RMSE: </a:t>
+            </a:r>
+            <a:r>
+              <a:rPr lang="en-US" b="1" dirty="0" smtClean="0"/>
+              <a:t>162.7 </a:t>
+            </a:r>
+            <a:r>
+              <a:rPr lang="en-US" b="1" dirty="0" smtClean="0"/>
+              <a:t>MWh</a:t>
             </a:r>
           </a:p>
           <a:p>
@@ -9143,7 +9120,7 @@
       </p:sp>
       <p:pic>
         <p:nvPicPr>
-          <p:cNvPr id="4" name="Picture 3"/>
+          <p:cNvPr id="5" name="Picture 4"/>
           <p:cNvPicPr>
             <a:picLocks noChangeAspect="1"/>
           </p:cNvPicPr>
@@ -9163,8 +9140,8 @@
         </p:blipFill>
         <p:spPr>
           <a:xfrm>
-            <a:off x="4329112" y="1294210"/>
-            <a:ext cx="7153275" cy="5364957"/>
+            <a:off x="4200526" y="1314451"/>
+            <a:ext cx="7447736" cy="5344716"/>
           </a:xfrm>
           <a:prstGeom prst="rect">
             <a:avLst/>
@@ -9593,7 +9570,7 @@
       </p:grpSpPr>
       <p:pic>
         <p:nvPicPr>
-          <p:cNvPr id="4" name="Picture 3"/>
+          <p:cNvPr id="2" name="Picture 1"/>
           <p:cNvPicPr>
             <a:picLocks noChangeAspect="1"/>
           </p:cNvPicPr>
@@ -9613,8 +9590,8 @@
         </p:blipFill>
         <p:spPr>
           <a:xfrm>
-            <a:off x="0" y="-1"/>
-            <a:ext cx="12192000" cy="6858001"/>
+            <a:off x="0" y="0"/>
+            <a:ext cx="12192000" cy="6858000"/>
           </a:xfrm>
           <a:prstGeom prst="rect">
             <a:avLst/>
@@ -9653,7 +9630,7 @@
       </p:grpSpPr>
       <p:pic>
         <p:nvPicPr>
-          <p:cNvPr id="4" name="Picture 3"/>
+          <p:cNvPr id="2" name="Picture 1"/>
           <p:cNvPicPr>
             <a:picLocks noChangeAspect="1"/>
           </p:cNvPicPr>
@@ -9674,7 +9651,7 @@
         <p:spPr>
           <a:xfrm>
             <a:off x="0" y="0"/>
-            <a:ext cx="12192000" cy="6863656"/>
+            <a:ext cx="12192000" cy="6858000"/>
           </a:xfrm>
           <a:prstGeom prst="rect">
             <a:avLst/>
@@ -10319,19 +10296,7 @@
             </a:pPr>
             <a:r>
               <a:rPr lang="en-US" sz="3600" dirty="0" smtClean="0"/>
-              <a:t>Hourly electricity and weather data gathered from </a:t>
-            </a:r>
-            <a:r>
-              <a:rPr lang="en-US" sz="3600" dirty="0" smtClean="0"/>
-              <a:t>the </a:t>
-            </a:r>
-            <a:r>
-              <a:rPr lang="en-US" sz="3600" dirty="0" smtClean="0"/>
-              <a:t>Los </a:t>
-            </a:r>
-            <a:r>
-              <a:rPr lang="en-US" sz="3600" dirty="0" smtClean="0"/>
-              <a:t>Angeles metropolitan areas</a:t>
+              <a:t>Hourly electricity and weather data gathered from the Los Angeles metropolitan areas</a:t>
             </a:r>
           </a:p>
           <a:p>
@@ -10366,11 +10331,7 @@
             </a:pPr>
             <a:r>
               <a:rPr lang="en-US" sz="3600" dirty="0" smtClean="0"/>
-              <a:t>Data </a:t>
-            </a:r>
-            <a:r>
-              <a:rPr lang="en-US" sz="3600" dirty="0" smtClean="0"/>
-              <a:t>from July 2015 to September 2018</a:t>
+              <a:t>Data from July 2015 to September 2018</a:t>
             </a:r>
           </a:p>
           <a:p>
@@ -10465,13 +10426,8 @@
             </a:pPr>
             <a:r>
               <a:rPr lang="en-US" sz="3600" dirty="0" smtClean="0"/>
-              <a:t>Local Climatological Data (LCD) was obtained </a:t>
-            </a:r>
-            <a:r>
-              <a:rPr lang="en-US" sz="3600" dirty="0" smtClean="0"/>
-              <a:t>LA metropolitan</a:t>
-            </a:r>
-            <a:endParaRPr lang="en-US" sz="3600" dirty="0" smtClean="0"/>
+              <a:t>Local Climatological Data (LCD) was obtained LA metropolitan</a:t>
+            </a:r>
           </a:p>
           <a:p>
             <a:pPr marL="0" indent="0">
@@ -10584,11 +10540,7 @@
             </a:pPr>
             <a:r>
               <a:rPr lang="en-US" dirty="0" smtClean="0"/>
-              <a:t>Removing outliers reduced the size of the data set by ~.01% </a:t>
-            </a:r>
-            <a:r>
-              <a:rPr lang="en-US" dirty="0" smtClean="0"/>
-              <a:t>for LA</a:t>
+              <a:t>Removing outliers reduced the size of the data set by ~.01% for LA</a:t>
             </a:r>
             <a:endParaRPr lang="en-US" dirty="0"/>
           </a:p>

</xml_diff>